<commit_message>
Prompt update. Added array of blocked websites for images. Updated presentations.
</commit_message>
<xml_diff>
--- a/bot/ai_generator/presentation_templates/Explore.pptx
+++ b/bot/ai_generator/presentation_templates/Explore.pptx
@@ -259,7 +259,7 @@
           <a:p>
             <a:fld id="{0DAF61AA-5A98-4049-A93E-477E5505141A}" type="datetimeFigureOut">
               <a:rPr lang="en-US" smtClean="0"/>
-              <a:t>4/13/2023</a:t>
+              <a:t>5/1/2023</a:t>
             </a:fld>
             <a:endParaRPr lang="en-US" dirty="0"/>
           </a:p>
@@ -457,7 +457,7 @@
           <a:p>
             <a:fld id="{0DAF61AA-5A98-4049-A93E-477E5505141A}" type="datetimeFigureOut">
               <a:rPr lang="en-US" smtClean="0"/>
-              <a:t>4/13/2023</a:t>
+              <a:t>5/1/2023</a:t>
             </a:fld>
             <a:endParaRPr lang="en-US"/>
           </a:p>
@@ -665,7 +665,7 @@
           <a:p>
             <a:fld id="{0DAF61AA-5A98-4049-A93E-477E5505141A}" type="datetimeFigureOut">
               <a:rPr lang="en-US" smtClean="0"/>
-              <a:t>4/13/2023</a:t>
+              <a:t>5/1/2023</a:t>
             </a:fld>
             <a:endParaRPr lang="en-US"/>
           </a:p>
@@ -806,35 +806,35 @@
           <a:p>
             <a:pPr lvl="0"/>
             <a:r>
-              <a:rPr lang="en-US"/>
+              <a:rPr lang="en-US" dirty="0"/>
               <a:t>Click to edit Master text styles</a:t>
             </a:r>
           </a:p>
           <a:p>
             <a:pPr lvl="1"/>
             <a:r>
-              <a:rPr lang="en-US"/>
+              <a:rPr lang="en-US" dirty="0"/>
               <a:t>Second level</a:t>
             </a:r>
           </a:p>
           <a:p>
             <a:pPr lvl="2"/>
             <a:r>
-              <a:rPr lang="en-US"/>
+              <a:rPr lang="en-US" dirty="0"/>
               <a:t>Third level</a:t>
             </a:r>
           </a:p>
           <a:p>
             <a:pPr lvl="3"/>
             <a:r>
-              <a:rPr lang="en-US"/>
+              <a:rPr lang="en-US" dirty="0"/>
               <a:t>Fourth level</a:t>
             </a:r>
           </a:p>
           <a:p>
             <a:pPr lvl="4"/>
             <a:r>
-              <a:rPr lang="en-US"/>
+              <a:rPr lang="en-US" dirty="0"/>
               <a:t>Fifth level</a:t>
             </a:r>
           </a:p>
@@ -863,7 +863,7 @@
           <a:p>
             <a:fld id="{0DAF61AA-5A98-4049-A93E-477E5505141A}" type="datetimeFigureOut">
               <a:rPr lang="en-US" smtClean="0"/>
-              <a:t>4/13/2023</a:t>
+              <a:t>5/1/2023</a:t>
             </a:fld>
             <a:endParaRPr lang="en-US"/>
           </a:p>
@@ -1138,7 +1138,7 @@
           <a:p>
             <a:fld id="{0DAF61AA-5A98-4049-A93E-477E5505141A}" type="datetimeFigureOut">
               <a:rPr lang="en-US" smtClean="0"/>
-              <a:t>4/13/2023</a:t>
+              <a:t>5/1/2023</a:t>
             </a:fld>
             <a:endParaRPr lang="en-US"/>
           </a:p>
@@ -1403,7 +1403,7 @@
           <a:p>
             <a:fld id="{0DAF61AA-5A98-4049-A93E-477E5505141A}" type="datetimeFigureOut">
               <a:rPr lang="en-US" smtClean="0"/>
-              <a:t>4/13/2023</a:t>
+              <a:t>5/1/2023</a:t>
             </a:fld>
             <a:endParaRPr lang="en-US"/>
           </a:p>
@@ -1815,7 +1815,7 @@
           <a:p>
             <a:fld id="{0DAF61AA-5A98-4049-A93E-477E5505141A}" type="datetimeFigureOut">
               <a:rPr lang="en-US" smtClean="0"/>
-              <a:t>4/13/2023</a:t>
+              <a:t>5/1/2023</a:t>
             </a:fld>
             <a:endParaRPr lang="en-US"/>
           </a:p>
@@ -1956,7 +1956,7 @@
           <a:p>
             <a:fld id="{0DAF61AA-5A98-4049-A93E-477E5505141A}" type="datetimeFigureOut">
               <a:rPr lang="en-US" smtClean="0"/>
-              <a:t>4/13/2023</a:t>
+              <a:t>5/1/2023</a:t>
             </a:fld>
             <a:endParaRPr lang="en-US"/>
           </a:p>
@@ -2069,7 +2069,7 @@
           <a:p>
             <a:fld id="{0DAF61AA-5A98-4049-A93E-477E5505141A}" type="datetimeFigureOut">
               <a:rPr lang="en-US" smtClean="0"/>
-              <a:t>4/13/2023</a:t>
+              <a:t>5/1/2023</a:t>
             </a:fld>
             <a:endParaRPr lang="en-US"/>
           </a:p>
@@ -2309,7 +2309,9 @@
           </a:xfrm>
         </p:spPr>
         <p:txBody>
-          <a:bodyPr/>
+          <a:bodyPr>
+            <a:normAutofit/>
+          </a:bodyPr>
           <a:lstStyle>
             <a:lvl1pPr marL="0" indent="0">
               <a:buNone/>
@@ -2351,7 +2353,7 @@
           <a:p>
             <a:pPr lvl="0"/>
             <a:r>
-              <a:rPr lang="en-US"/>
+              <a:rPr lang="en-US" dirty="0"/>
               <a:t>Click to edit Master text styles</a:t>
             </a:r>
           </a:p>
@@ -2380,7 +2382,7 @@
           <a:p>
             <a:fld id="{0DAF61AA-5A98-4049-A93E-477E5505141A}" type="datetimeFigureOut">
               <a:rPr lang="en-US" smtClean="0"/>
-              <a:t>4/13/2023</a:t>
+              <a:t>5/1/2023</a:t>
             </a:fld>
             <a:endParaRPr lang="en-US"/>
           </a:p>
@@ -2501,7 +2503,7 @@
           </a:lstStyle>
           <a:p>
             <a:r>
-              <a:rPr lang="en-US"/>
+              <a:rPr lang="en-US" dirty="0"/>
               <a:t>Click to edit Master title style</a:t>
             </a:r>
           </a:p>
@@ -2528,6 +2530,11 @@
             <a:off x="5183188" y="987425"/>
             <a:ext cx="6172200" cy="4873625"/>
           </a:xfrm>
+          <a:prstGeom prst="roundRect">
+            <a:avLst>
+              <a:gd name="adj" fmla="val 4618"/>
+            </a:avLst>
+          </a:prstGeom>
         </p:spPr>
         <p:txBody>
           <a:bodyPr/>
@@ -2600,7 +2607,9 @@
           </a:xfrm>
         </p:spPr>
         <p:txBody>
-          <a:bodyPr/>
+          <a:bodyPr>
+            <a:normAutofit/>
+          </a:bodyPr>
           <a:lstStyle>
             <a:lvl1pPr marL="0" indent="0">
               <a:buNone/>
@@ -2642,7 +2651,7 @@
           <a:p>
             <a:pPr lvl="0"/>
             <a:r>
-              <a:rPr lang="en-US"/>
+              <a:rPr lang="en-US" dirty="0"/>
               <a:t>Click to edit Master text styles</a:t>
             </a:r>
           </a:p>
@@ -2671,7 +2680,7 @@
           <a:p>
             <a:fld id="{0DAF61AA-5A98-4049-A93E-477E5505141A}" type="datetimeFigureOut">
               <a:rPr lang="en-US" smtClean="0"/>
-              <a:t>4/13/2023</a:t>
+              <a:t>5/1/2023</a:t>
             </a:fld>
             <a:endParaRPr lang="en-US"/>
           </a:p>
@@ -6381,7 +6390,7 @@
             <a:fld id="{0DAF61AA-5A98-4049-A93E-477E5505141A}" type="datetimeFigureOut">
               <a:rPr lang="en-US" smtClean="0"/>
               <a:pPr/>
-              <a:t>4/13/2023</a:t>
+              <a:t>5/1/2023</a:t>
             </a:fld>
             <a:endParaRPr lang="en-US" dirty="0"/>
           </a:p>
@@ -6821,7 +6830,7 @@
           <p:cNvPr id="2" name="Title 1">
             <a:extLst>
               <a:ext uri="{FF2B5EF4-FFF2-40B4-BE49-F238E27FC236}">
-                <a16:creationId xmlns:a16="http://schemas.microsoft.com/office/drawing/2014/main" id="{92C60780-674B-4C3F-8909-AD626F4E6EDF}"/>
+                <a16:creationId xmlns:a16="http://schemas.microsoft.com/office/drawing/2014/main" id="{E3B2B009-AFD1-4551-B4C2-00AE45A7B212}"/>
               </a:ext>
             </a:extLst>
           </p:cNvPr>
@@ -6834,7 +6843,9 @@
         </p:nvSpPr>
         <p:spPr/>
         <p:txBody>
-          <a:bodyPr/>
+          <a:bodyPr>
+            <a:normAutofit/>
+          </a:bodyPr>
           <a:lstStyle/>
           <a:p>
             <a:endParaRPr lang="ru-UA"/>
@@ -6846,7 +6857,7 @@
           <p:cNvPr id="3" name="Subtitle 2">
             <a:extLst>
               <a:ext uri="{FF2B5EF4-FFF2-40B4-BE49-F238E27FC236}">
-                <a16:creationId xmlns:a16="http://schemas.microsoft.com/office/drawing/2014/main" id="{B0A9AA0D-C3F2-4A42-B963-F28BEB8C96C2}"/>
+                <a16:creationId xmlns:a16="http://schemas.microsoft.com/office/drawing/2014/main" id="{E8C5CDEA-2243-400C-BC0B-DA661BAC1BFF}"/>
               </a:ext>
             </a:extLst>
           </p:cNvPr>
@@ -6859,7 +6870,9 @@
         </p:nvSpPr>
         <p:spPr/>
         <p:txBody>
-          <a:bodyPr/>
+          <a:bodyPr>
+            <a:normAutofit/>
+          </a:bodyPr>
           <a:lstStyle/>
           <a:p>
             <a:endParaRPr lang="ru-UA"/>
@@ -6869,7 +6882,7 @@
     </p:spTree>
     <p:extLst>
       <p:ext uri="{BB962C8B-B14F-4D97-AF65-F5344CB8AC3E}">
-        <p14:creationId xmlns:p14="http://schemas.microsoft.com/office/powerpoint/2010/main" val="3215969683"/>
+        <p14:creationId xmlns:p14="http://schemas.microsoft.com/office/powerpoint/2010/main" val="3714004331"/>
       </p:ext>
     </p:extLst>
   </p:cSld>

</xml_diff>